<commit_message>
Pictures updated not to have grammar underlines
</commit_message>
<xml_diff>
--- a/thesis/Architecture Diagram v2.0.pptx
+++ b/thesis/Architecture Diagram v2.0.pptx
@@ -284,7 +284,7 @@
           <a:p>
             <a:fld id="{D55ECC76-8EB5-4363-A59F-0D38F5FF4683}" type="datetimeFigureOut">
               <a:rPr lang="en-US" smtClean="0"/>
-              <a:t>3/15/21</a:t>
+              <a:t>3/18/21</a:t>
             </a:fld>
             <a:endParaRPr lang="en-US"/>
           </a:p>
@@ -482,7 +482,7 @@
           <a:p>
             <a:fld id="{D55ECC76-8EB5-4363-A59F-0D38F5FF4683}" type="datetimeFigureOut">
               <a:rPr lang="en-US" smtClean="0"/>
-              <a:t>3/15/21</a:t>
+              <a:t>3/18/21</a:t>
             </a:fld>
             <a:endParaRPr lang="en-US"/>
           </a:p>
@@ -690,7 +690,7 @@
           <a:p>
             <a:fld id="{D55ECC76-8EB5-4363-A59F-0D38F5FF4683}" type="datetimeFigureOut">
               <a:rPr lang="en-US" smtClean="0"/>
-              <a:t>3/15/21</a:t>
+              <a:t>3/18/21</a:t>
             </a:fld>
             <a:endParaRPr lang="en-US"/>
           </a:p>
@@ -888,7 +888,7 @@
           <a:p>
             <a:fld id="{D55ECC76-8EB5-4363-A59F-0D38F5FF4683}" type="datetimeFigureOut">
               <a:rPr lang="en-US" smtClean="0"/>
-              <a:t>3/15/21</a:t>
+              <a:t>3/18/21</a:t>
             </a:fld>
             <a:endParaRPr lang="en-US"/>
           </a:p>
@@ -1163,7 +1163,7 @@
           <a:p>
             <a:fld id="{D55ECC76-8EB5-4363-A59F-0D38F5FF4683}" type="datetimeFigureOut">
               <a:rPr lang="en-US" smtClean="0"/>
-              <a:t>3/15/21</a:t>
+              <a:t>3/18/21</a:t>
             </a:fld>
             <a:endParaRPr lang="en-US"/>
           </a:p>
@@ -1428,7 +1428,7 @@
           <a:p>
             <a:fld id="{D55ECC76-8EB5-4363-A59F-0D38F5FF4683}" type="datetimeFigureOut">
               <a:rPr lang="en-US" smtClean="0"/>
-              <a:t>3/15/21</a:t>
+              <a:t>3/18/21</a:t>
             </a:fld>
             <a:endParaRPr lang="en-US"/>
           </a:p>
@@ -1840,7 +1840,7 @@
           <a:p>
             <a:fld id="{D55ECC76-8EB5-4363-A59F-0D38F5FF4683}" type="datetimeFigureOut">
               <a:rPr lang="en-US" smtClean="0"/>
-              <a:t>3/15/21</a:t>
+              <a:t>3/18/21</a:t>
             </a:fld>
             <a:endParaRPr lang="en-US"/>
           </a:p>
@@ -1981,7 +1981,7 @@
           <a:p>
             <a:fld id="{D55ECC76-8EB5-4363-A59F-0D38F5FF4683}" type="datetimeFigureOut">
               <a:rPr lang="en-US" smtClean="0"/>
-              <a:t>3/15/21</a:t>
+              <a:t>3/18/21</a:t>
             </a:fld>
             <a:endParaRPr lang="en-US"/>
           </a:p>
@@ -2094,7 +2094,7 @@
           <a:p>
             <a:fld id="{D55ECC76-8EB5-4363-A59F-0D38F5FF4683}" type="datetimeFigureOut">
               <a:rPr lang="en-US" smtClean="0"/>
-              <a:t>3/15/21</a:t>
+              <a:t>3/18/21</a:t>
             </a:fld>
             <a:endParaRPr lang="en-US"/>
           </a:p>
@@ -2405,7 +2405,7 @@
           <a:p>
             <a:fld id="{D55ECC76-8EB5-4363-A59F-0D38F5FF4683}" type="datetimeFigureOut">
               <a:rPr lang="en-US" smtClean="0"/>
-              <a:t>3/15/21</a:t>
+              <a:t>3/18/21</a:t>
             </a:fld>
             <a:endParaRPr lang="en-US"/>
           </a:p>
@@ -2693,7 +2693,7 @@
           <a:p>
             <a:fld id="{D55ECC76-8EB5-4363-A59F-0D38F5FF4683}" type="datetimeFigureOut">
               <a:rPr lang="en-US" smtClean="0"/>
-              <a:t>3/15/21</a:t>
+              <a:t>3/18/21</a:t>
             </a:fld>
             <a:endParaRPr lang="en-US"/>
           </a:p>
@@ -2934,7 +2934,7 @@
           <a:p>
             <a:fld id="{D55ECC76-8EB5-4363-A59F-0D38F5FF4683}" type="datetimeFigureOut">
               <a:rPr lang="en-US" smtClean="0"/>
-              <a:t>3/15/21</a:t>
+              <a:t>3/18/21</a:t>
             </a:fld>
             <a:endParaRPr lang="en-US"/>
           </a:p>
@@ -3462,20 +3462,12 @@
           <a:p>
             <a:pPr algn="ctr"/>
             <a:r>
-              <a:rPr lang="en-US" dirty="0" err="1">
-                <a:solidFill>
-                  <a:schemeClr val="tx1"/>
-                </a:solidFill>
-              </a:rPr>
-              <a:t>JSONiq</a:t>
-            </a:r>
-            <a:r>
               <a:rPr lang="en-US" dirty="0">
                 <a:solidFill>
                   <a:schemeClr val="tx1"/>
                 </a:solidFill>
               </a:rPr>
-              <a:t> Query</a:t>
+              <a:t>JSONiq Query</a:t>
             </a:r>
           </a:p>
         </p:txBody>
@@ -9131,7 +9123,7 @@
           <a:lstStyle/>
           <a:p>
             <a:r>
-              <a:rPr lang="en-US"/>
+              <a:rPr lang="en-US" dirty="0"/>
               <a:t>HERE SHOULD BE PLUGIN ARCHITECTURE</a:t>
             </a:r>
           </a:p>
@@ -9158,7 +9150,7 @@
           <a:bodyPr/>
           <a:lstStyle/>
           <a:p>
-            <a:endParaRPr lang="en-US"/>
+            <a:endParaRPr lang="en-US" dirty="0"/>
           </a:p>
         </p:txBody>
       </p:sp>
@@ -9244,15 +9236,7 @@
             </a:r>
             <a:r>
               <a:rPr lang="en-US" sz="1200" dirty="0"/>
-              <a:t> into integer within the test-case. Or other differences between XQuery and </a:t>
-            </a:r>
-            <a:r>
-              <a:rPr lang="en-US" sz="1200" dirty="0" err="1"/>
-              <a:t>JSONiq</a:t>
-            </a:r>
-            <a:r>
-              <a:rPr lang="en-US" sz="1200" dirty="0"/>
-              <a:t> and also log the conversion that was performed</a:t>
+              <a:t> into integer within the test-case. Or other differences between XQuery and JSONiq and also log the conversion that was performed</a:t>
             </a:r>
           </a:p>
         </p:txBody>
@@ -9305,7 +9289,7 @@
           <a:p>
             <a:pPr algn="ctr"/>
             <a:r>
-              <a:rPr lang="en-US" dirty="0">
+              <a:rPr lang="en-US">
                 <a:solidFill>
                   <a:schemeClr val="tx1"/>
                 </a:solidFill>
@@ -9358,7 +9342,7 @@
           <a:p>
             <a:pPr algn="ctr"/>
             <a:r>
-              <a:rPr lang="en-US" dirty="0"/>
+              <a:rPr lang="en-US"/>
               <a:t>RUMBLE</a:t>
             </a:r>
           </a:p>
@@ -9407,7 +9391,7 @@
           <a:p>
             <a:pPr algn="ctr"/>
             <a:r>
-              <a:rPr lang="en-US" dirty="0"/>
+              <a:rPr lang="en-US"/>
               <a:t>SPARK</a:t>
             </a:r>
           </a:p>
@@ -9528,15 +9512,15 @@
           <a:lstStyle/>
           <a:p>
             <a:r>
-              <a:rPr lang="en-US" sz="1200" dirty="0"/>
+              <a:rPr lang="en-US" sz="1200"/>
               <a:t>Rumble we view as a </a:t>
             </a:r>
             <a:r>
-              <a:rPr lang="en-US" sz="1200" dirty="0" err="1"/>
+              <a:rPr lang="en-US" sz="1200" err="1"/>
               <a:t>blackbox</a:t>
             </a:r>
             <a:r>
-              <a:rPr lang="en-US" sz="1200" dirty="0"/>
+              <a:rPr lang="en-US" sz="1200"/>
               <a:t>. It is not in our interest what it does with Spark. We just need to get the query results from it!</a:t>
             </a:r>
           </a:p>
@@ -9577,7 +9561,7 @@
           <a:lstStyle/>
           <a:p>
             <a:r>
-              <a:rPr lang="en-US" sz="1200" dirty="0"/>
+              <a:rPr lang="en-US" sz="1200"/>
               <a:t>XML Parser. We can use some of already existing API's for XML parsing and processing. JAXP is one of them but I am not sure whether 1.6v is good for XQuery 3.1. Proposition is to use Saxon classes for this. Basically any external library</a:t>
             </a:r>
           </a:p>
@@ -9629,7 +9613,7 @@
           <a:p>
             <a:pPr algn="ctr"/>
             <a:r>
-              <a:rPr lang="en-US" dirty="0"/>
+              <a:rPr lang="en-US"/>
               <a:t>QT3 Test Suite</a:t>
             </a:r>
           </a:p>
@@ -9676,7 +9660,7 @@
           <a:p>
             <a:pPr algn="ctr"/>
             <a:r>
-              <a:rPr lang="en-US" dirty="0"/>
+              <a:rPr lang="en-US"/>
               <a:t>Test Driver</a:t>
             </a:r>
           </a:p>
@@ -9723,7 +9707,7 @@
           <a:p>
             <a:pPr algn="ctr"/>
             <a:r>
-              <a:rPr lang="en-US" dirty="0"/>
+              <a:rPr lang="en-US"/>
               <a:t>Test Report</a:t>
             </a:r>
           </a:p>
@@ -9817,7 +9801,7 @@
           <a:p>
             <a:pPr algn="ctr"/>
             <a:r>
-              <a:rPr lang="en-US" dirty="0"/>
+              <a:rPr lang="en-US"/>
               <a:t>XML Parser</a:t>
             </a:r>
           </a:p>
@@ -9870,7 +9854,7 @@
           <a:p>
             <a:pPr algn="ctr"/>
             <a:r>
-              <a:rPr lang="en-US" dirty="0"/>
+              <a:rPr lang="en-US"/>
               <a:t>Convertor</a:t>
             </a:r>
           </a:p>
@@ -10071,7 +10055,7 @@
           <a:lstStyle/>
           <a:p>
             <a:r>
-              <a:rPr lang="en-US" dirty="0"/>
+              <a:rPr lang="en-US"/>
               <a:t>Rumble API</a:t>
             </a:r>
           </a:p>
@@ -10112,7 +10096,7 @@
           <a:lstStyle/>
           <a:p>
             <a:r>
-              <a:rPr lang="en-US" sz="1200" dirty="0"/>
+              <a:rPr lang="en-US" sz="1200"/>
               <a:t>QT3 Test Suite should be analyzed and decided how to handle different versions of XQuery, XPath and XSLT test-cases </a:t>
             </a:r>
           </a:p>
@@ -10153,7 +10137,7 @@
           <a:lstStyle/>
           <a:p>
             <a:r>
-              <a:rPr lang="en-US" sz="1200" dirty="0"/>
+              <a:rPr lang="en-US" sz="1200"/>
               <a:t>Part 2: Test Report class is supposed to replace the Test Report Handling Logic. Now it should show statistics of passed/failed tests. This will now aggregate the data display a webpage</a:t>
             </a:r>
           </a:p>
@@ -10206,7 +10190,7 @@
           <a:p>
             <a:pPr algn="ctr"/>
             <a:r>
-              <a:rPr lang="en-US" dirty="0"/>
+              <a:rPr lang="en-US"/>
               <a:t>Test Case Handling Logic</a:t>
             </a:r>
           </a:p>
@@ -10318,25 +10302,25 @@
           <a:lstStyle/>
           <a:p>
             <a:r>
-              <a:rPr lang="en-US" sz="1200" dirty="0"/>
+              <a:rPr lang="en-US" sz="1200"/>
               <a:t>Part 3: Consider further refactoring of the code with possible usage of good Software Engineering practices and patterns. </a:t>
             </a:r>
           </a:p>
           <a:p>
-            <a:endParaRPr lang="en-US" sz="1200" dirty="0"/>
-          </a:p>
-          <a:p>
-            <a:r>
-              <a:rPr lang="en-US" sz="1200" dirty="0"/>
+            <a:endParaRPr lang="en-US" sz="1200"/>
+          </a:p>
+          <a:p>
+            <a:r>
+              <a:rPr lang="en-US" sz="1200"/>
               <a:t>Maybe extend convertor so that it is capable of in advance detecting the tests that cannot be run on Rumble based on previous Test Reports</a:t>
             </a:r>
           </a:p>
           <a:p>
-            <a:endParaRPr lang="en-US" sz="1200" dirty="0"/>
-          </a:p>
-          <a:p>
-            <a:r>
-              <a:rPr lang="en-US" sz="1200" dirty="0"/>
+            <a:endParaRPr lang="en-US" sz="1200"/>
+          </a:p>
+          <a:p>
+            <a:r>
+              <a:rPr lang="en-US" sz="1200"/>
               <a:t>Possible hidden issues: Test is run, it succeeds but produces different output not because of bug in Rumble but because of some other syntax issue</a:t>
             </a:r>
           </a:p>
@@ -10390,7 +10374,7 @@
           <a:p>
             <a:pPr algn="ctr"/>
             <a:r>
-              <a:rPr lang="en-US" dirty="0">
+              <a:rPr lang="en-US">
                 <a:solidFill>
                   <a:schemeClr val="tx1"/>
                 </a:solidFill>
@@ -10443,7 +10427,7 @@
           <a:p>
             <a:pPr algn="ctr"/>
             <a:r>
-              <a:rPr lang="en-US" dirty="0"/>
+              <a:rPr lang="en-US"/>
               <a:t>RUMBLE</a:t>
             </a:r>
           </a:p>
@@ -10492,7 +10476,7 @@
           <a:p>
             <a:pPr algn="ctr"/>
             <a:r>
-              <a:rPr lang="en-US" dirty="0"/>
+              <a:rPr lang="en-US"/>
               <a:t>SPARK</a:t>
             </a:r>
           </a:p>
@@ -10613,15 +10597,15 @@
           <a:lstStyle/>
           <a:p>
             <a:r>
-              <a:rPr lang="en-US" sz="1200" dirty="0"/>
+              <a:rPr lang="en-US" sz="1200"/>
               <a:t>Rumble we view as a </a:t>
             </a:r>
             <a:r>
-              <a:rPr lang="en-US" sz="1200" dirty="0" err="1"/>
+              <a:rPr lang="en-US" sz="1200" err="1"/>
               <a:t>blackbox</a:t>
             </a:r>
             <a:r>
-              <a:rPr lang="en-US" sz="1200" dirty="0"/>
+              <a:rPr lang="en-US" sz="1200"/>
               <a:t>. It is not in our interest what it does with Spark. We just need to get the query results from it!</a:t>
             </a:r>
           </a:p>
@@ -10662,7 +10646,7 @@
           <a:lstStyle/>
           <a:p>
             <a:r>
-              <a:rPr lang="en-US" sz="1200" dirty="0"/>
+              <a:rPr lang="en-US" sz="1200"/>
               <a:t>XML Parser. We can use some of already existing API's for XML parsing and processing. JAXP is one of them but I am not sure whether 1.6v is good for XQuery 3.1. Proposition is to use Saxon classes for this. Basically any external library</a:t>
             </a:r>
           </a:p>
@@ -10714,7 +10698,7 @@
           <a:p>
             <a:pPr algn="ctr"/>
             <a:r>
-              <a:rPr lang="en-US" dirty="0"/>
+              <a:rPr lang="en-US"/>
               <a:t>QT3 Test Suite</a:t>
             </a:r>
           </a:p>
@@ -10761,7 +10745,7 @@
           <a:p>
             <a:pPr algn="ctr"/>
             <a:r>
-              <a:rPr lang="en-US" dirty="0"/>
+              <a:rPr lang="en-US"/>
               <a:t>Test Driver</a:t>
             </a:r>
           </a:p>
@@ -10808,7 +10792,7 @@
           <a:p>
             <a:pPr algn="ctr"/>
             <a:r>
-              <a:rPr lang="en-US" dirty="0"/>
+              <a:rPr lang="en-US"/>
               <a:t>Test Report</a:t>
             </a:r>
           </a:p>
@@ -10902,7 +10886,7 @@
           <a:p>
             <a:pPr algn="ctr"/>
             <a:r>
-              <a:rPr lang="en-US" dirty="0"/>
+              <a:rPr lang="en-US"/>
               <a:t>XML Parser</a:t>
             </a:r>
           </a:p>
@@ -10955,7 +10939,7 @@
           <a:p>
             <a:pPr algn="ctr"/>
             <a:r>
-              <a:rPr lang="en-US" dirty="0"/>
+              <a:rPr lang="en-US"/>
               <a:t>Convertor</a:t>
             </a:r>
           </a:p>
@@ -11156,7 +11140,7 @@
           <a:lstStyle/>
           <a:p>
             <a:r>
-              <a:rPr lang="en-US" dirty="0"/>
+              <a:rPr lang="en-US"/>
               <a:t>Rumble API</a:t>
             </a:r>
           </a:p>
@@ -11197,7 +11181,7 @@
           <a:lstStyle/>
           <a:p>
             <a:r>
-              <a:rPr lang="en-US" sz="1200" dirty="0"/>
+              <a:rPr lang="en-US" sz="1200"/>
               <a:t>QT3 Test Suite should be analyzed and decided how to handle different versions of XQuery, XPath and XSLT test-cases </a:t>
             </a:r>
           </a:p>
@@ -11238,12 +11222,12 @@
           <a:lstStyle/>
           <a:p>
             <a:r>
-              <a:rPr lang="en-US" sz="1200" dirty="0"/>
+              <a:rPr lang="en-US" sz="1200"/>
               <a:t>Part 3: Consider maybe automatically opening and closing issues on git based on the statistics of the Test Report class. Maybe MVC pattern can be used here</a:t>
             </a:r>
           </a:p>
           <a:p>
-            <a:endParaRPr lang="en-US" sz="1200" dirty="0"/>
+            <a:endParaRPr lang="en-US" sz="1200"/>
           </a:p>
         </p:txBody>
       </p:sp>
@@ -11294,7 +11278,7 @@
           <a:p>
             <a:pPr algn="ctr"/>
             <a:r>
-              <a:rPr lang="en-US" dirty="0"/>
+              <a:rPr lang="en-US"/>
               <a:t>Test Case Handling Logic</a:t>
             </a:r>
           </a:p>
@@ -11482,20 +11466,12 @@
           <a:p>
             <a:pPr algn="ctr"/>
             <a:r>
-              <a:rPr lang="en-US" dirty="0" err="1">
-                <a:solidFill>
-                  <a:schemeClr val="tx1"/>
-                </a:solidFill>
-              </a:rPr>
-              <a:t>JSONiq</a:t>
-            </a:r>
-            <a:r>
               <a:rPr lang="en-US" dirty="0">
                 <a:solidFill>
                   <a:schemeClr val="tx1"/>
                 </a:solidFill>
               </a:rPr>
-              <a:t> Query</a:t>
+              <a:t>JSONiq Query</a:t>
             </a:r>
           </a:p>
         </p:txBody>
@@ -11883,12 +11859,8 @@
           <a:lstStyle/>
           <a:p>
             <a:r>
-              <a:rPr lang="en-US" dirty="0" err="1"/>
-              <a:t>Lexer</a:t>
-            </a:r>
-            <a:r>
               <a:rPr lang="en-US" dirty="0"/>
-              <a:t> &amp;Parser</a:t>
+              <a:t>Lexer &amp;Parser</a:t>
             </a:r>
           </a:p>
         </p:txBody>
@@ -12110,20 +12082,12 @@
           <a:p>
             <a:pPr algn="ctr"/>
             <a:r>
-              <a:rPr lang="en-US" dirty="0" err="1">
-                <a:solidFill>
-                  <a:schemeClr val="tx1"/>
-                </a:solidFill>
-              </a:rPr>
-              <a:t>JSONiq</a:t>
-            </a:r>
-            <a:r>
               <a:rPr lang="en-US" dirty="0">
                 <a:solidFill>
                   <a:schemeClr val="tx1"/>
                 </a:solidFill>
               </a:rPr>
-              <a:t> Query</a:t>
+              <a:t>JSONiq Query</a:t>
             </a:r>
           </a:p>
         </p:txBody>
@@ -12257,12 +12221,8 @@
           <a:lstStyle/>
           <a:p>
             <a:r>
-              <a:rPr lang="en-US" dirty="0" err="1"/>
-              <a:t>JSONiq</a:t>
-            </a:r>
-            <a:r>
               <a:rPr lang="en-US" dirty="0"/>
-              <a:t> Translator</a:t>
+              <a:t>JSONiq Translator</a:t>
             </a:r>
           </a:p>
         </p:txBody>
@@ -12352,19 +12312,14 @@
           <a:p>
             <a:pPr algn="ctr"/>
             <a:r>
-              <a:rPr lang="en-US" dirty="0" err="1"/>
+              <a:rPr lang="en-US" dirty="0"/>
               <a:t>JSONiq</a:t>
             </a:r>
-            <a:endParaRPr lang="en-US" dirty="0"/>
-          </a:p>
-          <a:p>
-            <a:r>
-              <a:rPr lang="en-US" dirty="0" err="1"/>
-              <a:t>Lexer</a:t>
-            </a:r>
+          </a:p>
+          <a:p>
             <a:r>
               <a:rPr lang="en-US" dirty="0"/>
-              <a:t> &amp;Parser</a:t>
+              <a:t>Lexer &amp;Parser</a:t>
             </a:r>
           </a:p>
         </p:txBody>
@@ -12595,12 +12550,8 @@
           </a:p>
           <a:p>
             <a:r>
-              <a:rPr lang="en-US" dirty="0" err="1"/>
-              <a:t>Lexer</a:t>
-            </a:r>
-            <a:r>
               <a:rPr lang="en-US" dirty="0"/>
-              <a:t> &amp;Parser</a:t>
+              <a:t>Lexer &amp;Parser</a:t>
             </a:r>
           </a:p>
         </p:txBody>
@@ -12878,13 +12829,8 @@
           <a:p>
             <a:r>
               <a:rPr lang="en-US" dirty="0"/>
-              <a:t>Serialize to </a:t>
-            </a:r>
-            <a:r>
-              <a:rPr lang="en-US" dirty="0" err="1"/>
-              <a:t>JSONiq</a:t>
-            </a:r>
-            <a:endParaRPr lang="en-US" dirty="0"/>
+              <a:t>Serialize to JSONiq</a:t>
+            </a:r>
           </a:p>
         </p:txBody>
       </p:sp>
@@ -15115,12 +15061,8 @@
           <a:p>
             <a:pPr algn="ctr"/>
             <a:r>
-              <a:rPr lang="en-US" dirty="0" err="1"/>
-              <a:t>JSONiq</a:t>
-            </a:r>
-            <a:r>
               <a:rPr lang="en-US" dirty="0"/>
-              <a:t> Test Suite</a:t>
+              <a:t>JSONiq Test Suite</a:t>
             </a:r>
           </a:p>
         </p:txBody>
@@ -16929,12 +16871,8 @@
           <a:p>
             <a:pPr algn="ctr"/>
             <a:r>
-              <a:rPr lang="en-US" dirty="0" err="1"/>
-              <a:t>JSONiq</a:t>
-            </a:r>
-            <a:r>
               <a:rPr lang="en-US" dirty="0"/>
-              <a:t> Test Suite</a:t>
+              <a:t>JSONiq Test Suite</a:t>
             </a:r>
           </a:p>
         </p:txBody>
@@ -17788,12 +17726,8 @@
           <a:p>
             <a:pPr algn="ctr"/>
             <a:r>
-              <a:rPr lang="en-US" dirty="0" err="1"/>
-              <a:t>JSONiq</a:t>
-            </a:r>
-            <a:r>
               <a:rPr lang="en-US" dirty="0"/>
-              <a:t> Test Suite</a:t>
+              <a:t>JSONiq Test Suite</a:t>
             </a:r>
           </a:p>
         </p:txBody>

</xml_diff>